<commit_message>
Updating with correct files
</commit_message>
<xml_diff>
--- a/ProjectDocs/Sprint 2/Squander_Deliverable 2.pptx
+++ b/ProjectDocs/Sprint 2/Squander_Deliverable 2.pptx
@@ -334,11 +334,95 @@
 <pc:chgInfo xmlns:a="http://schemas.openxmlformats.org/drawingml/2006/main" xmlns:r="http://schemas.openxmlformats.org/officeDocument/2006/relationships" xmlns:ac="http://schemas.microsoft.com/office/drawing/2013/main/command" xmlns:pc="http://schemas.microsoft.com/office/powerpoint/2013/main/command">
   <pc:docChgLst>
     <pc:chgData name="Aakansha Agarwala" userId="80d71404950ebe3a" providerId="LiveId" clId="{B3AC1EDA-7498-4D62-A8DD-5EC0CF32989A}"/>
-    <pc:docChg chg="modSld">
-      <pc:chgData name="Aakansha Agarwala" userId="80d71404950ebe3a" providerId="LiveId" clId="{B3AC1EDA-7498-4D62-A8DD-5EC0CF32989A}" dt="2022-03-24T16:28:55.363" v="56" actId="1037"/>
+    <pc:docChg chg="undo custSel modSld">
+      <pc:chgData name="Aakansha Agarwala" userId="80d71404950ebe3a" providerId="LiveId" clId="{B3AC1EDA-7498-4D62-A8DD-5EC0CF32989A}" dt="2022-03-24T17:42:06.938" v="153" actId="1035"/>
       <pc:docMkLst>
         <pc:docMk/>
       </pc:docMkLst>
+      <pc:sldChg chg="modSp mod">
+        <pc:chgData name="Aakansha Agarwala" userId="80d71404950ebe3a" providerId="LiveId" clId="{B3AC1EDA-7498-4D62-A8DD-5EC0CF32989A}" dt="2022-03-24T17:42:06.938" v="153" actId="1035"/>
+        <pc:sldMkLst>
+          <pc:docMk/>
+          <pc:sldMk cId="0" sldId="258"/>
+        </pc:sldMkLst>
+        <pc:spChg chg="mod">
+          <ac:chgData name="Aakansha Agarwala" userId="80d71404950ebe3a" providerId="LiveId" clId="{B3AC1EDA-7498-4D62-A8DD-5EC0CF32989A}" dt="2022-03-24T17:42:06.938" v="153" actId="1035"/>
+          <ac:spMkLst>
+            <pc:docMk/>
+            <pc:sldMk cId="0" sldId="258"/>
+            <ac:spMk id="120" creationId="{00000000-0000-0000-0000-000000000000}"/>
+          </ac:spMkLst>
+        </pc:spChg>
+      </pc:sldChg>
+      <pc:sldChg chg="modSp mod">
+        <pc:chgData name="Aakansha Agarwala" userId="80d71404950ebe3a" providerId="LiveId" clId="{B3AC1EDA-7498-4D62-A8DD-5EC0CF32989A}" dt="2022-03-24T17:39:51.406" v="102" actId="1076"/>
+        <pc:sldMkLst>
+          <pc:docMk/>
+          <pc:sldMk cId="0" sldId="259"/>
+        </pc:sldMkLst>
+        <pc:spChg chg="mod">
+          <ac:chgData name="Aakansha Agarwala" userId="80d71404950ebe3a" providerId="LiveId" clId="{B3AC1EDA-7498-4D62-A8DD-5EC0CF32989A}" dt="2022-03-24T17:39:39.221" v="100" actId="20577"/>
+          <ac:spMkLst>
+            <pc:docMk/>
+            <pc:sldMk cId="0" sldId="259"/>
+            <ac:spMk id="126" creationId="{00000000-0000-0000-0000-000000000000}"/>
+          </ac:spMkLst>
+        </pc:spChg>
+        <pc:picChg chg="mod">
+          <ac:chgData name="Aakansha Agarwala" userId="80d71404950ebe3a" providerId="LiveId" clId="{B3AC1EDA-7498-4D62-A8DD-5EC0CF32989A}" dt="2022-03-24T17:39:51.406" v="102" actId="1076"/>
+          <ac:picMkLst>
+            <pc:docMk/>
+            <pc:sldMk cId="0" sldId="259"/>
+            <ac:picMk id="127" creationId="{00000000-0000-0000-0000-000000000000}"/>
+          </ac:picMkLst>
+        </pc:picChg>
+        <pc:picChg chg="mod">
+          <ac:chgData name="Aakansha Agarwala" userId="80d71404950ebe3a" providerId="LiveId" clId="{B3AC1EDA-7498-4D62-A8DD-5EC0CF32989A}" dt="2022-03-24T17:39:48.533" v="101" actId="1076"/>
+          <ac:picMkLst>
+            <pc:docMk/>
+            <pc:sldMk cId="0" sldId="259"/>
+            <ac:picMk id="128" creationId="{00000000-0000-0000-0000-000000000000}"/>
+          </ac:picMkLst>
+        </pc:picChg>
+        <pc:picChg chg="mod">
+          <ac:chgData name="Aakansha Agarwala" userId="80d71404950ebe3a" providerId="LiveId" clId="{B3AC1EDA-7498-4D62-A8DD-5EC0CF32989A}" dt="2022-03-24T17:39:27.127" v="77" actId="1076"/>
+          <ac:picMkLst>
+            <pc:docMk/>
+            <pc:sldMk cId="0" sldId="259"/>
+            <ac:picMk id="129" creationId="{00000000-0000-0000-0000-000000000000}"/>
+          </ac:picMkLst>
+        </pc:picChg>
+      </pc:sldChg>
+      <pc:sldChg chg="modSp mod">
+        <pc:chgData name="Aakansha Agarwala" userId="80d71404950ebe3a" providerId="LiveId" clId="{B3AC1EDA-7498-4D62-A8DD-5EC0CF32989A}" dt="2022-03-24T17:41:02.306" v="125" actId="122"/>
+        <pc:sldMkLst>
+          <pc:docMk/>
+          <pc:sldMk cId="0" sldId="268"/>
+        </pc:sldMkLst>
+        <pc:spChg chg="mod">
+          <ac:chgData name="Aakansha Agarwala" userId="80d71404950ebe3a" providerId="LiveId" clId="{B3AC1EDA-7498-4D62-A8DD-5EC0CF32989A}" dt="2022-03-24T17:41:02.306" v="125" actId="122"/>
+          <ac:spMkLst>
+            <pc:docMk/>
+            <pc:sldMk cId="0" sldId="268"/>
+            <ac:spMk id="214" creationId="{00000000-0000-0000-0000-000000000000}"/>
+          </ac:spMkLst>
+        </pc:spChg>
+      </pc:sldChg>
+      <pc:sldChg chg="modSp mod">
+        <pc:chgData name="Aakansha Agarwala" userId="80d71404950ebe3a" providerId="LiveId" clId="{B3AC1EDA-7498-4D62-A8DD-5EC0CF32989A}" dt="2022-03-24T17:41:22.526" v="133" actId="122"/>
+        <pc:sldMkLst>
+          <pc:docMk/>
+          <pc:sldMk cId="0" sldId="269"/>
+        </pc:sldMkLst>
+        <pc:spChg chg="mod">
+          <ac:chgData name="Aakansha Agarwala" userId="80d71404950ebe3a" providerId="LiveId" clId="{B3AC1EDA-7498-4D62-A8DD-5EC0CF32989A}" dt="2022-03-24T17:41:22.526" v="133" actId="122"/>
+          <ac:spMkLst>
+            <pc:docMk/>
+            <pc:sldMk cId="0" sldId="269"/>
+            <ac:spMk id="230" creationId="{00000000-0000-0000-0000-000000000000}"/>
+          </ac:spMkLst>
+        </pc:spChg>
+      </pc:sldChg>
       <pc:sldChg chg="modSp mod">
         <pc:chgData name="Aakansha Agarwala" userId="80d71404950ebe3a" providerId="LiveId" clId="{B3AC1EDA-7498-4D62-A8DD-5EC0CF32989A}" dt="2022-03-24T16:28:55.363" v="56" actId="1037"/>
         <pc:sldMkLst>
@@ -1245,7 +1329,7 @@
         </p:nvSpPr>
         <p:spPr>
           <a:xfrm>
-            <a:off x="381300" y="685800"/>
+            <a:off x="381000" y="685800"/>
             <a:ext cx="6096000" cy="3429000"/>
           </a:xfrm>
           <a:custGeom>
@@ -1349,7 +1433,7 @@
         </p:nvSpPr>
         <p:spPr>
           <a:xfrm>
-            <a:off x="381300" y="685800"/>
+            <a:off x="381000" y="685800"/>
             <a:ext cx="6096000" cy="3429000"/>
           </a:xfrm>
           <a:custGeom>
@@ -12032,14 +12116,14 @@
               <a:buNone/>
             </a:pPr>
             <a:r>
-              <a:rPr lang="en"/>
+              <a:rPr lang="en" dirty="0"/>
               <a:t>        </a:t>
             </a:r>
             <a:r>
-              <a:rPr lang="en" sz="1200"/>
+              <a:rPr lang="en" sz="1200" dirty="0"/>
               <a:t>When</a:t>
             </a:r>
-            <a:endParaRPr sz="1200"/>
+            <a:endParaRPr sz="1200" dirty="0"/>
           </a:p>
         </p:txBody>
       </p:sp>
@@ -12731,14 +12815,14 @@
               <a:buNone/>
             </a:pPr>
             <a:r>
-              <a:rPr lang="en"/>
+              <a:rPr lang="en" dirty="0"/>
               <a:t>        </a:t>
             </a:r>
             <a:r>
-              <a:rPr lang="en" sz="1200"/>
+              <a:rPr lang="en" sz="1200" dirty="0"/>
               <a:t>Given</a:t>
             </a:r>
-            <a:endParaRPr sz="1200"/>
+            <a:endParaRPr sz="1200" dirty="0"/>
           </a:p>
         </p:txBody>
       </p:sp>
@@ -12784,7 +12868,7 @@
           </a:bodyPr>
           <a:lstStyle/>
           <a:p>
-            <a:pPr marL="0" lvl="0" indent="0" algn="l" rtl="0">
+            <a:pPr marL="0" lvl="0" indent="0" algn="ctr" rtl="0">
               <a:spcBef>
                 <a:spcPts val="0"/>
               </a:spcBef>
@@ -12794,10 +12878,10 @@
               <a:buNone/>
             </a:pPr>
             <a:r>
-              <a:rPr lang="en"/>
-              <a:t>	When</a:t>
+              <a:rPr lang="en" sz="1200" dirty="0"/>
+              <a:t>When</a:t>
             </a:r>
-            <a:endParaRPr/>
+            <a:endParaRPr sz="1200" dirty="0"/>
           </a:p>
         </p:txBody>
       </p:sp>
@@ -13543,7 +13627,7 @@
           </a:bodyPr>
           <a:lstStyle/>
           <a:p>
-            <a:pPr marL="0" lvl="0" indent="0" algn="l" rtl="0">
+            <a:pPr marL="0" lvl="0" indent="0" algn="ctr" rtl="0">
               <a:spcBef>
                 <a:spcPts val="0"/>
               </a:spcBef>
@@ -13553,10 +13637,10 @@
               <a:buNone/>
             </a:pPr>
             <a:r>
-              <a:rPr lang="en"/>
-              <a:t>	When</a:t>
+              <a:rPr lang="en" sz="1300" dirty="0"/>
+              <a:t>When</a:t>
             </a:r>
-            <a:endParaRPr/>
+            <a:endParaRPr sz="1300" dirty="0"/>
           </a:p>
         </p:txBody>
       </p:sp>
@@ -19835,7 +19919,7 @@
         </p:nvSpPr>
         <p:spPr>
           <a:xfrm>
-            <a:off x="546950" y="1577750"/>
+            <a:off x="546950" y="1414470"/>
             <a:ext cx="8025600" cy="3124500"/>
           </a:xfrm>
           <a:prstGeom prst="rect">
@@ -20557,7 +20641,7 @@
                   <a:srgbClr val="666666"/>
                 </a:solidFill>
               </a:rPr>
-              <a:t>Uploading Image		Processing Image 		Image Results 		Find Nearby Location </a:t>
+              <a:t>Uploading Image	    Processing Image                Image Results 	             Find Nearby Location </a:t>
             </a:r>
             <a:endParaRPr sz="1500" dirty="0">
               <a:solidFill>
@@ -20583,7 +20667,7 @@
         </p:blipFill>
         <p:spPr>
           <a:xfrm>
-            <a:off x="463575" y="3321700"/>
+            <a:off x="469821" y="3458300"/>
             <a:ext cx="1194800" cy="1194800"/>
           </a:xfrm>
           <a:prstGeom prst="rect">
@@ -20611,7 +20695,7 @@
         </p:blipFill>
         <p:spPr>
           <a:xfrm>
-            <a:off x="2937225" y="3474100"/>
+            <a:off x="2611472" y="3656499"/>
             <a:ext cx="996601" cy="996601"/>
           </a:xfrm>
           <a:prstGeom prst="rect">
@@ -20639,7 +20723,7 @@
         </p:blipFill>
         <p:spPr>
           <a:xfrm>
-            <a:off x="4856575" y="3189626"/>
+            <a:off x="4572000" y="3358700"/>
             <a:ext cx="1455475" cy="1455450"/>
           </a:xfrm>
           <a:prstGeom prst="rect">

</xml_diff>